<commit_message>
New Slida and update to Problem slide
Added a PyQT slide where Jordan will go over the GUI we used and updated
our Problem slide with a few problems I found that our bot tries to
address.
</commit_message>
<xml_diff>
--- a/Documents/ProjectPresentation.pptx
+++ b/Documents/ProjectPresentation.pptx
@@ -5,10 +5,10 @@
     <p:sldMasterId id="2147483876" r:id="rId4"/>
   </p:sldMasterIdLst>
   <p:notesMasterIdLst>
-    <p:notesMasterId r:id="rId12"/>
+    <p:notesMasterId r:id="rId13"/>
   </p:notesMasterIdLst>
   <p:handoutMasterIdLst>
-    <p:handoutMasterId r:id="rId13"/>
+    <p:handoutMasterId r:id="rId14"/>
   </p:handoutMasterIdLst>
   <p:sldIdLst>
     <p:sldId id="265" r:id="rId5"/>
@@ -18,11 +18,12 @@
     <p:sldId id="268" r:id="rId9"/>
     <p:sldId id="269" r:id="rId10"/>
     <p:sldId id="271" r:id="rId11"/>
+    <p:sldId id="272" r:id="rId12"/>
   </p:sldIdLst>
   <p:sldSz cx="12188825" cy="6858000"/>
   <p:notesSz cx="6858000" cy="9144000"/>
   <p:custDataLst>
-    <p:tags r:id="rId14"/>
+    <p:tags r:id="rId15"/>
   </p:custDataLst>
   <p:defaultTextStyle>
     <a:defPPr>
@@ -223,7 +224,7 @@
           <a:p>
             <a:fld id="{59088EAF-6ECA-4616-85EF-35AA19C641F3}" type="datetimeFigureOut">
               <a:rPr lang="en-US"/>
-              <a:t>3/10/2017</a:t>
+              <a:t>3/15/2017</a:t>
             </a:fld>
             <a:endParaRPr/>
           </a:p>
@@ -388,7 +389,7 @@
           <a:p>
             <a:fld id="{3ABD2D7A-D230-4F91-BD59-0A39C2703BA8}" type="datetimeFigureOut">
               <a:rPr lang="en-US"/>
-              <a:t>3/10/2017</a:t>
+              <a:t>3/15/2017</a:t>
             </a:fld>
             <a:endParaRPr/>
           </a:p>
@@ -1157,7 +1158,7 @@
           <a:p>
             <a:fld id="{48A87A34-81AB-432B-8DAE-1953F412C126}" type="datetimeFigureOut">
               <a:rPr lang="en-US" smtClean="0"/>
-              <a:t>3/10/2017</a:t>
+              <a:t>3/15/2017</a:t>
             </a:fld>
             <a:endParaRPr lang="en-US" dirty="0"/>
           </a:p>
@@ -1466,7 +1467,7 @@
             <a:fld id="{03F41C87-7AD9-4845-A077-840E4A0F3F06}" type="datetimeFigureOut">
               <a:rPr lang="en-US" smtClean="0"/>
               <a:pPr/>
-              <a:t>3/10/2017</a:t>
+              <a:t>3/15/2017</a:t>
             </a:fld>
             <a:endParaRPr lang="en-US"/>
           </a:p>
@@ -1716,7 +1717,7 @@
             <a:fld id="{03F41C87-7AD9-4845-A077-840E4A0F3F06}" type="datetimeFigureOut">
               <a:rPr lang="en-US" smtClean="0"/>
               <a:pPr/>
-              <a:t>3/10/2017</a:t>
+              <a:t>3/15/2017</a:t>
             </a:fld>
             <a:endParaRPr lang="en-US"/>
           </a:p>
@@ -2258,7 +2259,7 @@
             <a:fld id="{03F41C87-7AD9-4845-A077-840E4A0F3F06}" type="datetimeFigureOut">
               <a:rPr lang="en-US" smtClean="0"/>
               <a:pPr/>
-              <a:t>3/10/2017</a:t>
+              <a:t>3/15/2017</a:t>
             </a:fld>
             <a:endParaRPr lang="en-US"/>
           </a:p>
@@ -2508,7 +2509,7 @@
             <a:fld id="{03F41C87-7AD9-4845-A077-840E4A0F3F06}" type="datetimeFigureOut">
               <a:rPr lang="en-US" smtClean="0"/>
               <a:pPr/>
-              <a:t>3/10/2017</a:t>
+              <a:t>3/15/2017</a:t>
             </a:fld>
             <a:endParaRPr lang="en-US"/>
           </a:p>
@@ -3042,7 +3043,7 @@
             <a:fld id="{03F41C87-7AD9-4845-A077-840E4A0F3F06}" type="datetimeFigureOut">
               <a:rPr lang="en-US" smtClean="0"/>
               <a:pPr/>
-              <a:t>3/10/2017</a:t>
+              <a:t>3/15/2017</a:t>
             </a:fld>
             <a:endParaRPr lang="en-US"/>
           </a:p>
@@ -3341,7 +3342,7 @@
             <a:fld id="{03F41C87-7AD9-4845-A077-840E4A0F3F06}" type="datetimeFigureOut">
               <a:rPr lang="en-US" smtClean="0"/>
               <a:pPr/>
-              <a:t>3/10/2017</a:t>
+              <a:t>3/15/2017</a:t>
             </a:fld>
             <a:endParaRPr lang="en-US"/>
           </a:p>
@@ -3516,7 +3517,7 @@
           <a:p>
             <a:fld id="{03F41C87-7AD9-4845-A077-840E4A0F3F06}" type="datetimeFigureOut">
               <a:rPr lang="en-US" smtClean="0"/>
-              <a:t>3/10/2017</a:t>
+              <a:t>3/15/2017</a:t>
             </a:fld>
             <a:endParaRPr lang="en-US"/>
           </a:p>
@@ -3708,7 +3709,7 @@
           <a:p>
             <a:fld id="{03F41C87-7AD9-4845-A077-840E4A0F3F06}" type="datetimeFigureOut">
               <a:rPr lang="en-US" smtClean="0"/>
-              <a:t>3/10/2017</a:t>
+              <a:t>3/15/2017</a:t>
             </a:fld>
             <a:endParaRPr lang="en-US"/>
           </a:p>
@@ -3890,7 +3891,7 @@
           <a:p>
             <a:fld id="{03F41C87-7AD9-4845-A077-840E4A0F3F06}" type="datetimeFigureOut">
               <a:rPr lang="en-US" smtClean="0"/>
-              <a:t>3/10/2017</a:t>
+              <a:t>3/15/2017</a:t>
             </a:fld>
             <a:endParaRPr lang="en-US"/>
           </a:p>
@@ -4153,7 +4154,7 @@
           <a:p>
             <a:fld id="{03F41C87-7AD9-4845-A077-840E4A0F3F06}" type="datetimeFigureOut">
               <a:rPr lang="en-US" smtClean="0"/>
-              <a:t>3/10/2017</a:t>
+              <a:t>3/15/2017</a:t>
             </a:fld>
             <a:endParaRPr lang="en-US"/>
           </a:p>
@@ -4462,7 +4463,7 @@
           <a:p>
             <a:fld id="{03F41C87-7AD9-4845-A077-840E4A0F3F06}" type="datetimeFigureOut">
               <a:rPr lang="en-US" smtClean="0"/>
-              <a:t>3/10/2017</a:t>
+              <a:t>3/15/2017</a:t>
             </a:fld>
             <a:endParaRPr lang="en-US"/>
           </a:p>
@@ -4916,7 +4917,7 @@
           <a:p>
             <a:fld id="{03F41C87-7AD9-4845-A077-840E4A0F3F06}" type="datetimeFigureOut">
               <a:rPr lang="en-US" smtClean="0"/>
-              <a:t>3/10/2017</a:t>
+              <a:t>3/15/2017</a:t>
             </a:fld>
             <a:endParaRPr lang="en-US"/>
           </a:p>
@@ -5046,7 +5047,7 @@
           <a:p>
             <a:fld id="{03F41C87-7AD9-4845-A077-840E4A0F3F06}" type="datetimeFigureOut">
               <a:rPr lang="en-US" smtClean="0"/>
-              <a:t>3/10/2017</a:t>
+              <a:t>3/15/2017</a:t>
             </a:fld>
             <a:endParaRPr lang="en-US"/>
           </a:p>
@@ -5153,7 +5154,7 @@
           <a:p>
             <a:fld id="{03F41C87-7AD9-4845-A077-840E4A0F3F06}" type="datetimeFigureOut">
               <a:rPr lang="en-US" smtClean="0"/>
-              <a:t>3/10/2017</a:t>
+              <a:t>3/15/2017</a:t>
             </a:fld>
             <a:endParaRPr lang="en-US"/>
           </a:p>
@@ -5448,7 +5449,7 @@
           <a:p>
             <a:fld id="{03F41C87-7AD9-4845-A077-840E4A0F3F06}" type="datetimeFigureOut">
               <a:rPr lang="en-US" smtClean="0"/>
-              <a:t>3/10/2017</a:t>
+              <a:t>3/15/2017</a:t>
             </a:fld>
             <a:endParaRPr lang="en-US"/>
           </a:p>
@@ -5752,7 +5753,7 @@
             <a:fld id="{03F41C87-7AD9-4845-A077-840E4A0F3F06}" type="datetimeFigureOut">
               <a:rPr lang="en-US" smtClean="0"/>
               <a:pPr/>
-              <a:t>3/10/2017</a:t>
+              <a:t>3/15/2017</a:t>
             </a:fld>
             <a:endParaRPr lang="en-US"/>
           </a:p>
@@ -6296,7 +6297,7 @@
             <a:fld id="{03F41C87-7AD9-4845-A077-840E4A0F3F06}" type="datetimeFigureOut">
               <a:rPr lang="en-US" smtClean="0"/>
               <a:pPr/>
-              <a:t>3/10/2017</a:t>
+              <a:t>3/15/2017</a:t>
             </a:fld>
             <a:endParaRPr lang="en-US"/>
           </a:p>
@@ -6912,13 +6913,13 @@
   <p:clrMapOvr>
     <a:masterClrMapping/>
   </p:clrMapOvr>
-  <mc:AlternateContent xmlns:mc="http://schemas.openxmlformats.org/markup-compatibility/2006">
-    <mc:Choice xmlns:p15="http://schemas.microsoft.com/office/powerpoint/2012/main" Requires="p15">
+  <mc:AlternateContent xmlns:mc="http://schemas.openxmlformats.org/markup-compatibility/2006" xmlns:p15="http://schemas.microsoft.com/office/powerpoint/2012/main">
+    <mc:Choice Requires="p15">
       <p:transition xmlns:p14="http://schemas.microsoft.com/office/powerpoint/2010/main" spd="slow" p14:dur="2000">
         <p15:prstTrans prst="crush"/>
       </p:transition>
     </mc:Choice>
-    <mc:Fallback>
+    <mc:Fallback xmlns="">
       <p:transition spd="slow">
         <p:fade/>
       </p:transition>
@@ -7113,9 +7114,53 @@
         </p:nvSpPr>
         <p:spPr/>
         <p:txBody>
-          <a:bodyPr/>
+          <a:bodyPr>
+            <a:normAutofit lnSpcReduction="10000"/>
+          </a:bodyPr>
           <a:lstStyle/>
           <a:p>
+            <a:r>
+              <a:rPr lang="en-US" dirty="0"/>
+              <a:t>Players of this game need to train to improve their skills</a:t>
+            </a:r>
+          </a:p>
+          <a:p>
+            <a:r>
+              <a:rPr lang="en-US" dirty="0"/>
+              <a:t>It is difficult to find a good training partner</a:t>
+            </a:r>
+          </a:p>
+          <a:p>
+            <a:r>
+              <a:rPr lang="en-US" dirty="0"/>
+              <a:t>Playing against the built in bots does not adequately prepare an individual for play against other humans</a:t>
+            </a:r>
+          </a:p>
+          <a:p>
+            <a:pPr lvl="1"/>
+            <a:r>
+              <a:rPr lang="en-US" dirty="0"/>
+              <a:t>The built in AI does not use any highly technical moves</a:t>
+            </a:r>
+          </a:p>
+          <a:p>
+            <a:pPr lvl="1"/>
+            <a:r>
+              <a:rPr lang="en-US" dirty="0"/>
+              <a:t>The built in AI acts in a very predictable manner</a:t>
+            </a:r>
+          </a:p>
+          <a:p>
+            <a:pPr lvl="1"/>
+            <a:r>
+              <a:rPr lang="en-US" dirty="0"/>
+              <a:t>The built in AI does not improve</a:t>
+            </a:r>
+          </a:p>
+          <a:p>
+            <a:pPr marL="0" indent="0">
+              <a:buNone/>
+            </a:pPr>
             <a:endParaRPr lang="en-US" dirty="0"/>
           </a:p>
         </p:txBody>
@@ -7351,13 +7396,8 @@
           <a:p>
             <a:r>
               <a:rPr lang="en-US" dirty="0"/>
-              <a:t>Asynchronous Advantage </a:t>
-            </a:r>
-            <a:r>
-              <a:rPr lang="en-US"/>
-              <a:t>Actor Critic (A3C)</a:t>
-            </a:r>
-            <a:endParaRPr lang="en-US" dirty="0"/>
+              <a:t>Asynchronous Advantage Actor Critic (A3C)</a:t>
+            </a:r>
           </a:p>
         </p:txBody>
       </p:sp>
@@ -7376,7 +7416,10 @@
           <a:bodyPr/>
           <a:lstStyle/>
           <a:p>
-            <a:endParaRPr lang="en-US"/>
+            <a:r>
+              <a:rPr lang="en-US" dirty="0"/>
+              <a:t>After this slide I think we should show videos of the bots progression while learning. One of it before learning, one after a day or two, and one after a few weeks. We should also put in two or three clips of the bot running with an ally bot to show off A3C’s use with multiple agents.</a:t>
+            </a:r>
           </a:p>
         </p:txBody>
       </p:sp>
@@ -7467,6 +7510,93 @@
     <p:extLst>
       <p:ext uri="{BB962C8B-B14F-4D97-AF65-F5344CB8AC3E}">
         <p14:creationId xmlns:p14="http://schemas.microsoft.com/office/powerpoint/2010/main" val="198296853"/>
+      </p:ext>
+    </p:extLst>
+  </p:cSld>
+  <p:clrMapOvr>
+    <a:masterClrMapping/>
+  </p:clrMapOvr>
+  <mc:AlternateContent xmlns:mc="http://schemas.openxmlformats.org/markup-compatibility/2006" xmlns:p14="http://schemas.microsoft.com/office/powerpoint/2010/main">
+    <mc:Choice Requires="p14">
+      <p:transition spd="med" p14:dur="700">
+        <p:fade/>
+      </p:transition>
+    </mc:Choice>
+    <mc:Fallback xmlns="">
+      <p:transition spd="med">
+        <p:fade/>
+      </p:transition>
+    </mc:Fallback>
+  </mc:AlternateContent>
+</p:sld>
+</file>
+
+<file path=ppt/slides/slide8.xml><?xml version="1.0" encoding="utf-8"?>
+<p:sld xmlns:a="http://schemas.openxmlformats.org/drawingml/2006/main" xmlns:r="http://schemas.openxmlformats.org/officeDocument/2006/relationships" xmlns:p="http://schemas.openxmlformats.org/presentationml/2006/main">
+  <p:cSld>
+    <p:spTree>
+      <p:nvGrpSpPr>
+        <p:cNvPr id="1" name=""/>
+        <p:cNvGrpSpPr/>
+        <p:nvPr/>
+      </p:nvGrpSpPr>
+      <p:grpSpPr>
+        <a:xfrm>
+          <a:off x="0" y="0"/>
+          <a:ext cx="0" cy="0"/>
+          <a:chOff x="0" y="0"/>
+          <a:chExt cx="0" cy="0"/>
+        </a:xfrm>
+      </p:grpSpPr>
+      <p:sp>
+        <p:nvSpPr>
+          <p:cNvPr id="2" name="Title 1"/>
+          <p:cNvSpPr>
+            <a:spLocks noGrp="1"/>
+          </p:cNvSpPr>
+          <p:nvPr>
+            <p:ph type="title"/>
+          </p:nvPr>
+        </p:nvSpPr>
+        <p:spPr/>
+        <p:txBody>
+          <a:bodyPr/>
+          <a:lstStyle/>
+          <a:p>
+            <a:r>
+              <a:rPr lang="en-US" dirty="0" err="1"/>
+              <a:t>PyQT</a:t>
+            </a:r>
+            <a:r>
+              <a:rPr lang="en-US" dirty="0"/>
+              <a:t> - GUI</a:t>
+            </a:r>
+          </a:p>
+        </p:txBody>
+      </p:sp>
+      <p:sp>
+        <p:nvSpPr>
+          <p:cNvPr id="3" name="Content Placeholder 2"/>
+          <p:cNvSpPr>
+            <a:spLocks noGrp="1"/>
+          </p:cNvSpPr>
+          <p:nvPr>
+            <p:ph idx="1"/>
+          </p:nvPr>
+        </p:nvSpPr>
+        <p:spPr/>
+        <p:txBody>
+          <a:bodyPr/>
+          <a:lstStyle/>
+          <a:p>
+            <a:endParaRPr lang="en-US" dirty="0"/>
+          </a:p>
+        </p:txBody>
+      </p:sp>
+    </p:spTree>
+    <p:extLst>
+      <p:ext uri="{BB962C8B-B14F-4D97-AF65-F5344CB8AC3E}">
+        <p14:creationId xmlns:p14="http://schemas.microsoft.com/office/powerpoint/2010/main" val="356333825"/>
       </p:ext>
     </p:extLst>
   </p:cSld>
@@ -9303,6 +9433,15 @@
 </file>
 
 <file path=customXml/item2.xml><?xml version="1.0" encoding="utf-8"?>
+<?mso-contentType ?>
+<FormTemplates xmlns="http://schemas.microsoft.com/sharepoint/v3/contenttype/forms">
+  <Display>DocumentLibraryForm</Display>
+  <Edit>AssetEditForm</Edit>
+  <New>DocumentLibraryForm</New>
+</FormTemplates>
+</file>
+
+<file path=customXml/item3.xml><?xml version="1.0" encoding="utf-8"?>
 <p:properties xmlns:p="http://schemas.microsoft.com/office/2006/metadata/properties" xmlns:xsi="http://www.w3.org/2001/XMLSchema-instance" xmlns:pc="http://schemas.microsoft.com/office/infopath/2007/PartnerControls">
   <documentManagement>
     <DirectSourceMarket xmlns="4873beb7-5857-4685-be1f-d57550cc96cc" xsi:nil="true"/>
@@ -9429,15 +9568,6 @@
 </p:properties>
 </file>
 
-<file path=customXml/item3.xml><?xml version="1.0" encoding="utf-8"?>
-<?mso-contentType ?>
-<FormTemplates xmlns="http://schemas.microsoft.com/sharepoint/v3/contenttype/forms">
-  <Display>DocumentLibraryForm</Display>
-  <Edit>AssetEditForm</Edit>
-  <New>DocumentLibraryForm</New>
-</FormTemplates>
-</file>
-
 <file path=customXml/itemProps1.xml><?xml version="1.0" encoding="utf-8"?>
 <ds:datastoreItem xmlns:ds="http://schemas.openxmlformats.org/officeDocument/2006/customXml" ds:itemID="{22CCB507-0646-4A50-A4F7-7F385079D589}">
   <ds:schemaRefs>
@@ -9457,6 +9587,14 @@
 </file>
 
 <file path=customXml/itemProps2.xml><?xml version="1.0" encoding="utf-8"?>
+<ds:datastoreItem xmlns:ds="http://schemas.openxmlformats.org/officeDocument/2006/customXml" ds:itemID="{74228E6B-D70C-44BB-A81F-A245495F612B}">
+  <ds:schemaRefs>
+    <ds:schemaRef ds:uri="http://schemas.microsoft.com/sharepoint/v3/contenttype/forms"/>
+  </ds:schemaRefs>
+</ds:datastoreItem>
+</file>
+
+<file path=customXml/itemProps3.xml><?xml version="1.0" encoding="utf-8"?>
 <ds:datastoreItem xmlns:ds="http://schemas.openxmlformats.org/officeDocument/2006/customXml" ds:itemID="{00E41224-0370-4595-877C-23316CD80004}">
   <ds:schemaRefs>
     <ds:schemaRef ds:uri="http://schemas.openxmlformats.org/package/2006/metadata/core-properties"/>
@@ -9470,12 +9608,4 @@
     <ds:schemaRef ds:uri="http://purl.org/dc/dcmitype/"/>
   </ds:schemaRefs>
 </ds:datastoreItem>
-</file>
-
-<file path=customXml/itemProps3.xml><?xml version="1.0" encoding="utf-8"?>
-<ds:datastoreItem xmlns:ds="http://schemas.openxmlformats.org/officeDocument/2006/customXml" ds:itemID="{74228E6B-D70C-44BB-A81F-A245495F612B}">
-  <ds:schemaRefs>
-    <ds:schemaRef ds:uri="http://schemas.microsoft.com/sharepoint/v3/contenttype/forms"/>
-  </ds:schemaRefs>
-</ds:datastoreItem>
 </file>
</xml_diff>

<commit_message>
Assigned members to each slide
I gave each of us a few slides to finish and practice for tomorrow.
</commit_message>
<xml_diff>
--- a/Documents/ProjectPresentation.pptx
+++ b/Documents/ProjectPresentation.pptx
@@ -14,13 +14,13 @@
     <p:sldId id="265" r:id="rId5"/>
     <p:sldId id="270" r:id="rId6"/>
     <p:sldId id="267" r:id="rId7"/>
-    <p:sldId id="266" r:id="rId8"/>
-    <p:sldId id="273" r:id="rId9"/>
-    <p:sldId id="268" r:id="rId10"/>
-    <p:sldId id="269" r:id="rId11"/>
-    <p:sldId id="271" r:id="rId12"/>
-    <p:sldId id="274" r:id="rId13"/>
-    <p:sldId id="272" r:id="rId14"/>
+    <p:sldId id="268" r:id="rId8"/>
+    <p:sldId id="269" r:id="rId9"/>
+    <p:sldId id="271" r:id="rId10"/>
+    <p:sldId id="273" r:id="rId11"/>
+    <p:sldId id="274" r:id="rId12"/>
+    <p:sldId id="272" r:id="rId13"/>
+    <p:sldId id="275" r:id="rId14"/>
   </p:sldIdLst>
   <p:sldSz cx="12188825" cy="6858000"/>
   <p:notesSz cx="6858000" cy="9144000"/>
@@ -226,7 +226,7 @@
           <a:p>
             <a:fld id="{59088EAF-6ECA-4616-85EF-35AA19C641F3}" type="datetimeFigureOut">
               <a:rPr lang="en-US"/>
-              <a:t>3/24/2017</a:t>
+              <a:t>3/28/2017</a:t>
             </a:fld>
             <a:endParaRPr/>
           </a:p>
@@ -391,7 +391,7 @@
           <a:p>
             <a:fld id="{3ABD2D7A-D230-4F91-BD59-0A39C2703BA8}" type="datetimeFigureOut">
               <a:rPr lang="en-US"/>
-              <a:t>3/24/2017</a:t>
+              <a:t>3/28/2017</a:t>
             </a:fld>
             <a:endParaRPr/>
           </a:p>
@@ -1155,7 +1155,7 @@
           <a:p>
             <a:fld id="{48A87A34-81AB-432B-8DAE-1953F412C126}" type="datetimeFigureOut">
               <a:rPr lang="en-US" smtClean="0"/>
-              <a:t>3/24/2017</a:t>
+              <a:t>3/28/2017</a:t>
             </a:fld>
             <a:endParaRPr lang="en-US" dirty="0"/>
           </a:p>
@@ -1464,7 +1464,7 @@
             <a:fld id="{03F41C87-7AD9-4845-A077-840E4A0F3F06}" type="datetimeFigureOut">
               <a:rPr lang="en-US" smtClean="0"/>
               <a:pPr/>
-              <a:t>3/24/2017</a:t>
+              <a:t>3/28/2017</a:t>
             </a:fld>
             <a:endParaRPr lang="en-US"/>
           </a:p>
@@ -1714,7 +1714,7 @@
             <a:fld id="{03F41C87-7AD9-4845-A077-840E4A0F3F06}" type="datetimeFigureOut">
               <a:rPr lang="en-US" smtClean="0"/>
               <a:pPr/>
-              <a:t>3/24/2017</a:t>
+              <a:t>3/28/2017</a:t>
             </a:fld>
             <a:endParaRPr lang="en-US"/>
           </a:p>
@@ -2256,7 +2256,7 @@
             <a:fld id="{03F41C87-7AD9-4845-A077-840E4A0F3F06}" type="datetimeFigureOut">
               <a:rPr lang="en-US" smtClean="0"/>
               <a:pPr/>
-              <a:t>3/24/2017</a:t>
+              <a:t>3/28/2017</a:t>
             </a:fld>
             <a:endParaRPr lang="en-US"/>
           </a:p>
@@ -2506,7 +2506,7 @@
             <a:fld id="{03F41C87-7AD9-4845-A077-840E4A0F3F06}" type="datetimeFigureOut">
               <a:rPr lang="en-US" smtClean="0"/>
               <a:pPr/>
-              <a:t>3/24/2017</a:t>
+              <a:t>3/28/2017</a:t>
             </a:fld>
             <a:endParaRPr lang="en-US"/>
           </a:p>
@@ -3040,7 +3040,7 @@
             <a:fld id="{03F41C87-7AD9-4845-A077-840E4A0F3F06}" type="datetimeFigureOut">
               <a:rPr lang="en-US" smtClean="0"/>
               <a:pPr/>
-              <a:t>3/24/2017</a:t>
+              <a:t>3/28/2017</a:t>
             </a:fld>
             <a:endParaRPr lang="en-US"/>
           </a:p>
@@ -3339,7 +3339,7 @@
             <a:fld id="{03F41C87-7AD9-4845-A077-840E4A0F3F06}" type="datetimeFigureOut">
               <a:rPr lang="en-US" smtClean="0"/>
               <a:pPr/>
-              <a:t>3/24/2017</a:t>
+              <a:t>3/28/2017</a:t>
             </a:fld>
             <a:endParaRPr lang="en-US"/>
           </a:p>
@@ -3514,7 +3514,7 @@
           <a:p>
             <a:fld id="{03F41C87-7AD9-4845-A077-840E4A0F3F06}" type="datetimeFigureOut">
               <a:rPr lang="en-US" smtClean="0"/>
-              <a:t>3/24/2017</a:t>
+              <a:t>3/28/2017</a:t>
             </a:fld>
             <a:endParaRPr lang="en-US"/>
           </a:p>
@@ -3706,7 +3706,7 @@
           <a:p>
             <a:fld id="{03F41C87-7AD9-4845-A077-840E4A0F3F06}" type="datetimeFigureOut">
               <a:rPr lang="en-US" smtClean="0"/>
-              <a:t>3/24/2017</a:t>
+              <a:t>3/28/2017</a:t>
             </a:fld>
             <a:endParaRPr lang="en-US"/>
           </a:p>
@@ -3888,7 +3888,7 @@
           <a:p>
             <a:fld id="{03F41C87-7AD9-4845-A077-840E4A0F3F06}" type="datetimeFigureOut">
               <a:rPr lang="en-US" smtClean="0"/>
-              <a:t>3/24/2017</a:t>
+              <a:t>3/28/2017</a:t>
             </a:fld>
             <a:endParaRPr lang="en-US"/>
           </a:p>
@@ -4151,7 +4151,7 @@
           <a:p>
             <a:fld id="{03F41C87-7AD9-4845-A077-840E4A0F3F06}" type="datetimeFigureOut">
               <a:rPr lang="en-US" smtClean="0"/>
-              <a:t>3/24/2017</a:t>
+              <a:t>3/28/2017</a:t>
             </a:fld>
             <a:endParaRPr lang="en-US"/>
           </a:p>
@@ -4460,7 +4460,7 @@
           <a:p>
             <a:fld id="{03F41C87-7AD9-4845-A077-840E4A0F3F06}" type="datetimeFigureOut">
               <a:rPr lang="en-US" smtClean="0"/>
-              <a:t>3/24/2017</a:t>
+              <a:t>3/28/2017</a:t>
             </a:fld>
             <a:endParaRPr lang="en-US"/>
           </a:p>
@@ -4914,7 +4914,7 @@
           <a:p>
             <a:fld id="{03F41C87-7AD9-4845-A077-840E4A0F3F06}" type="datetimeFigureOut">
               <a:rPr lang="en-US" smtClean="0"/>
-              <a:t>3/24/2017</a:t>
+              <a:t>3/28/2017</a:t>
             </a:fld>
             <a:endParaRPr lang="en-US"/>
           </a:p>
@@ -5044,7 +5044,7 @@
           <a:p>
             <a:fld id="{03F41C87-7AD9-4845-A077-840E4A0F3F06}" type="datetimeFigureOut">
               <a:rPr lang="en-US" smtClean="0"/>
-              <a:t>3/24/2017</a:t>
+              <a:t>3/28/2017</a:t>
             </a:fld>
             <a:endParaRPr lang="en-US"/>
           </a:p>
@@ -5151,7 +5151,7 @@
           <a:p>
             <a:fld id="{03F41C87-7AD9-4845-A077-840E4A0F3F06}" type="datetimeFigureOut">
               <a:rPr lang="en-US" smtClean="0"/>
-              <a:t>3/24/2017</a:t>
+              <a:t>3/28/2017</a:t>
             </a:fld>
             <a:endParaRPr lang="en-US"/>
           </a:p>
@@ -5446,7 +5446,7 @@
           <a:p>
             <a:fld id="{03F41C87-7AD9-4845-A077-840E4A0F3F06}" type="datetimeFigureOut">
               <a:rPr lang="en-US" smtClean="0"/>
-              <a:t>3/24/2017</a:t>
+              <a:t>3/28/2017</a:t>
             </a:fld>
             <a:endParaRPr lang="en-US"/>
           </a:p>
@@ -5750,7 +5750,7 @@
             <a:fld id="{03F41C87-7AD9-4845-A077-840E4A0F3F06}" type="datetimeFigureOut">
               <a:rPr lang="en-US" smtClean="0"/>
               <a:pPr/>
-              <a:t>3/24/2017</a:t>
+              <a:t>3/28/2017</a:t>
             </a:fld>
             <a:endParaRPr lang="en-US"/>
           </a:p>
@@ -6294,7 +6294,7 @@
             <a:fld id="{03F41C87-7AD9-4845-A077-840E4A0F3F06}" type="datetimeFigureOut">
               <a:rPr lang="en-US" smtClean="0"/>
               <a:pPr/>
-              <a:t>3/24/2017</a:t>
+              <a:t>3/28/2017</a:t>
             </a:fld>
             <a:endParaRPr lang="en-US"/>
           </a:p>
@@ -6958,12 +6958,8 @@
           <a:lstStyle/>
           <a:p>
             <a:r>
-              <a:rPr lang="en-US" dirty="0" err="1"/>
-              <a:t>PyQT</a:t>
-            </a:r>
-            <a:r>
               <a:rPr lang="en-US" dirty="0"/>
-              <a:t> - GUI</a:t>
+              <a:t>Applications (Jordan)</a:t>
             </a:r>
           </a:p>
         </p:txBody>
@@ -6983,14 +6979,14 @@
           <a:bodyPr/>
           <a:lstStyle/>
           <a:p>
-            <a:endParaRPr lang="en-US" dirty="0"/>
+            <a:endParaRPr lang="en-US"/>
           </a:p>
         </p:txBody>
       </p:sp>
     </p:spTree>
     <p:extLst>
       <p:ext uri="{BB962C8B-B14F-4D97-AF65-F5344CB8AC3E}">
-        <p14:creationId xmlns:p14="http://schemas.microsoft.com/office/powerpoint/2010/main" val="356333825"/>
+        <p14:creationId xmlns:p14="http://schemas.microsoft.com/office/powerpoint/2010/main" val="755175350"/>
       </p:ext>
     </p:extLst>
   </p:cSld>
@@ -7046,7 +7042,7 @@
           <a:p>
             <a:r>
               <a:rPr lang="en-US" dirty="0"/>
-              <a:t>Super Smash Brothers Melee (SSBM)</a:t>
+              <a:t>Super Smash Brothers Melee (SSBM) (Brant)</a:t>
             </a:r>
           </a:p>
         </p:txBody>
@@ -7196,7 +7192,7 @@
           <a:p>
             <a:r>
               <a:rPr lang="en-US" dirty="0"/>
-              <a:t>Problem</a:t>
+              <a:t>Problem (Brant)</a:t>
             </a:r>
           </a:p>
         </p:txBody>
@@ -7323,7 +7319,7 @@
           <a:p>
             <a:r>
               <a:rPr lang="en-US" dirty="0"/>
-              <a:t>Fixing the problem</a:t>
+              <a:t>Fixing the Problem (Kegan)</a:t>
             </a:r>
           </a:p>
         </p:txBody>
@@ -7343,12 +7339,9 @@
           <a:bodyPr/>
           <a:lstStyle/>
           <a:p>
-            <a:pPr marL="0" indent="0">
-              <a:buNone/>
-            </a:pPr>
             <a:r>
               <a:rPr lang="en-US" dirty="0"/>
-              <a:t>Machine Learning</a:t>
+              <a:t>Talk about what Reinforcement learning is and why we chose it over supervised and unsupervised.</a:t>
             </a:r>
           </a:p>
         </p:txBody>
@@ -7356,7 +7349,7 @@
     </p:spTree>
     <p:extLst>
       <p:ext uri="{BB962C8B-B14F-4D97-AF65-F5344CB8AC3E}">
-        <p14:creationId xmlns:p14="http://schemas.microsoft.com/office/powerpoint/2010/main" val="2617607715"/>
+        <p14:creationId xmlns:p14="http://schemas.microsoft.com/office/powerpoint/2010/main" val="2854175971"/>
       </p:ext>
     </p:extLst>
   </p:cSld>
@@ -7412,7 +7405,7 @@
           <a:p>
             <a:r>
               <a:rPr lang="en-US" dirty="0"/>
-              <a:t>Environment</a:t>
+              <a:t>Asynchronous Advantage Actor Critic (A3C) (Kegan)</a:t>
             </a:r>
           </a:p>
         </p:txBody>
@@ -7429,50 +7422,12 @@
         </p:nvSpPr>
         <p:spPr/>
         <p:txBody>
-          <a:bodyPr>
-            <a:normAutofit fontScale="92500" lnSpcReduction="10000"/>
-          </a:bodyPr>
+          <a:bodyPr/>
           <a:lstStyle/>
           <a:p>
             <a:r>
               <a:rPr lang="en-US" dirty="0"/>
-              <a:t>Partially Observable through the game’s RAM</a:t>
-            </a:r>
-          </a:p>
-          <a:p>
-            <a:r>
-              <a:rPr lang="en-US" dirty="0"/>
-              <a:t>Deterministic not Stochastic</a:t>
-            </a:r>
-          </a:p>
-          <a:p>
-            <a:r>
-              <a:rPr lang="en-US" dirty="0"/>
-              <a:t>Multiple Agents</a:t>
-            </a:r>
-          </a:p>
-          <a:p>
-            <a:r>
-              <a:rPr lang="en-US" dirty="0"/>
-              <a:t>Sequential not Episodic</a:t>
-            </a:r>
-          </a:p>
-          <a:p>
-            <a:r>
-              <a:rPr lang="en-US" dirty="0"/>
-              <a:t>Dynamic not Static</a:t>
-            </a:r>
-          </a:p>
-          <a:p>
-            <a:r>
-              <a:rPr lang="en-US" dirty="0"/>
-              <a:t>Unknown physics</a:t>
-            </a:r>
-          </a:p>
-          <a:p>
-            <a:r>
-              <a:rPr lang="en-US" dirty="0"/>
-              <a:t>Discrete not continuous</a:t>
+              <a:t>After this slide I think we should show videos of the bots progression while learning. One of it before learning, one after a day or two, and one after a few weeks. We should also put in two or three clips of the bot running with an ally bot to show off A3C’s use with multiple agents.</a:t>
             </a:r>
           </a:p>
         </p:txBody>
@@ -7480,7 +7435,7 @@
     </p:spTree>
     <p:extLst>
       <p:ext uri="{BB962C8B-B14F-4D97-AF65-F5344CB8AC3E}">
-        <p14:creationId xmlns:p14="http://schemas.microsoft.com/office/powerpoint/2010/main" val="1283098322"/>
+        <p14:creationId xmlns:p14="http://schemas.microsoft.com/office/powerpoint/2010/main" val="229318570"/>
       </p:ext>
     </p:extLst>
   </p:cSld>
@@ -7536,7 +7491,7 @@
           <a:p>
             <a:r>
               <a:rPr lang="en-US" dirty="0"/>
-              <a:t>Reinforcement Learning</a:t>
+              <a:t>Reward System (Jay)</a:t>
             </a:r>
           </a:p>
         </p:txBody>
@@ -7556,17 +7511,14 @@
           <a:bodyPr/>
           <a:lstStyle/>
           <a:p>
-            <a:r>
-              <a:rPr lang="en-US" dirty="0"/>
-              <a:t>Talk about what Reinforcement learning is and why we chose it over supervised and unsupervised.</a:t>
-            </a:r>
+            <a:endParaRPr lang="en-US"/>
           </a:p>
         </p:txBody>
       </p:sp>
     </p:spTree>
     <p:extLst>
       <p:ext uri="{BB962C8B-B14F-4D97-AF65-F5344CB8AC3E}">
-        <p14:creationId xmlns:p14="http://schemas.microsoft.com/office/powerpoint/2010/main" val="2854175971"/>
+        <p14:creationId xmlns:p14="http://schemas.microsoft.com/office/powerpoint/2010/main" val="198296853"/>
       </p:ext>
     </p:extLst>
   </p:cSld>
@@ -7622,7 +7574,7 @@
           <a:p>
             <a:r>
               <a:rPr lang="en-US" dirty="0"/>
-              <a:t>Asynchronous Advantage Actor Critic (A3C)</a:t>
+              <a:t>Environment (Jay)</a:t>
             </a:r>
           </a:p>
         </p:txBody>
@@ -7639,12 +7591,50 @@
         </p:nvSpPr>
         <p:spPr/>
         <p:txBody>
-          <a:bodyPr/>
+          <a:bodyPr>
+            <a:normAutofit fontScale="92500" lnSpcReduction="10000"/>
+          </a:bodyPr>
           <a:lstStyle/>
           <a:p>
             <a:r>
               <a:rPr lang="en-US" dirty="0"/>
-              <a:t>After this slide I think we should show videos of the bots progression while learning. One of it before learning, one after a day or two, and one after a few weeks. We should also put in two or three clips of the bot running with an ally bot to show off A3C’s use with multiple agents.</a:t>
+              <a:t>Partially Observable through the game’s RAM</a:t>
+            </a:r>
+          </a:p>
+          <a:p>
+            <a:r>
+              <a:rPr lang="en-US" dirty="0"/>
+              <a:t>Deterministic not Stochastic</a:t>
+            </a:r>
+          </a:p>
+          <a:p>
+            <a:r>
+              <a:rPr lang="en-US" dirty="0"/>
+              <a:t>Multiple Agents</a:t>
+            </a:r>
+          </a:p>
+          <a:p>
+            <a:r>
+              <a:rPr lang="en-US" dirty="0"/>
+              <a:t>Sequential not Episodic</a:t>
+            </a:r>
+          </a:p>
+          <a:p>
+            <a:r>
+              <a:rPr lang="en-US" dirty="0"/>
+              <a:t>Dynamic not Static</a:t>
+            </a:r>
+          </a:p>
+          <a:p>
+            <a:r>
+              <a:rPr lang="en-US" dirty="0"/>
+              <a:t>Unknown physics</a:t>
+            </a:r>
+          </a:p>
+          <a:p>
+            <a:r>
+              <a:rPr lang="en-US" dirty="0"/>
+              <a:t>Discrete not continuous</a:t>
             </a:r>
           </a:p>
         </p:txBody>
@@ -7652,7 +7642,7 @@
     </p:spTree>
     <p:extLst>
       <p:ext uri="{BB962C8B-B14F-4D97-AF65-F5344CB8AC3E}">
-        <p14:creationId xmlns:p14="http://schemas.microsoft.com/office/powerpoint/2010/main" val="229318570"/>
+        <p14:creationId xmlns:p14="http://schemas.microsoft.com/office/powerpoint/2010/main" val="1283098322"/>
       </p:ext>
     </p:extLst>
   </p:cSld>
@@ -7708,7 +7698,7 @@
           <a:p>
             <a:r>
               <a:rPr lang="en-US" dirty="0"/>
-              <a:t>Reward System</a:t>
+              <a:t>Training (Jay)</a:t>
             </a:r>
           </a:p>
         </p:txBody>
@@ -7735,7 +7725,7 @@
     </p:spTree>
     <p:extLst>
       <p:ext uri="{BB962C8B-B14F-4D97-AF65-F5344CB8AC3E}">
-        <p14:creationId xmlns:p14="http://schemas.microsoft.com/office/powerpoint/2010/main" val="198296853"/>
+        <p14:creationId xmlns:p14="http://schemas.microsoft.com/office/powerpoint/2010/main" val="4159471737"/>
       </p:ext>
     </p:extLst>
   </p:cSld>
@@ -7790,8 +7780,12 @@
           <a:lstStyle/>
           <a:p>
             <a:r>
+              <a:rPr lang="en-US" dirty="0" err="1"/>
+              <a:t>PyQT</a:t>
+            </a:r>
+            <a:r>
               <a:rPr lang="en-US" dirty="0"/>
-              <a:t>Training</a:t>
+              <a:t> – GUI (Jordan)</a:t>
             </a:r>
           </a:p>
         </p:txBody>
@@ -7811,14 +7805,14 @@
           <a:bodyPr/>
           <a:lstStyle/>
           <a:p>
-            <a:endParaRPr lang="en-US"/>
+            <a:endParaRPr lang="en-US" dirty="0"/>
           </a:p>
         </p:txBody>
       </p:sp>
     </p:spTree>
     <p:extLst>
       <p:ext uri="{BB962C8B-B14F-4D97-AF65-F5344CB8AC3E}">
-        <p14:creationId xmlns:p14="http://schemas.microsoft.com/office/powerpoint/2010/main" val="4159471737"/>
+        <p14:creationId xmlns:p14="http://schemas.microsoft.com/office/powerpoint/2010/main" val="356333825"/>
       </p:ext>
     </p:extLst>
   </p:cSld>
@@ -9655,6 +9649,15 @@
 </file>
 
 <file path=customXml/item2.xml><?xml version="1.0" encoding="utf-8"?>
+<?mso-contentType ?>
+<FormTemplates xmlns="http://schemas.microsoft.com/sharepoint/v3/contenttype/forms">
+  <Display>DocumentLibraryForm</Display>
+  <Edit>AssetEditForm</Edit>
+  <New>DocumentLibraryForm</New>
+</FormTemplates>
+</file>
+
+<file path=customXml/item3.xml><?xml version="1.0" encoding="utf-8"?>
 <p:properties xmlns:p="http://schemas.microsoft.com/office/2006/metadata/properties" xmlns:xsi="http://www.w3.org/2001/XMLSchema-instance" xmlns:pc="http://schemas.microsoft.com/office/infopath/2007/PartnerControls">
   <documentManagement>
     <DirectSourceMarket xmlns="4873beb7-5857-4685-be1f-d57550cc96cc" xsi:nil="true"/>
@@ -9781,15 +9784,6 @@
 </p:properties>
 </file>
 
-<file path=customXml/item3.xml><?xml version="1.0" encoding="utf-8"?>
-<?mso-contentType ?>
-<FormTemplates xmlns="http://schemas.microsoft.com/sharepoint/v3/contenttype/forms">
-  <Display>DocumentLibraryForm</Display>
-  <Edit>AssetEditForm</Edit>
-  <New>DocumentLibraryForm</New>
-</FormTemplates>
-</file>
-
 <file path=customXml/itemProps1.xml><?xml version="1.0" encoding="utf-8"?>
 <ds:datastoreItem xmlns:ds="http://schemas.openxmlformats.org/officeDocument/2006/customXml" ds:itemID="{22CCB507-0646-4A50-A4F7-7F385079D589}">
   <ds:schemaRefs>
@@ -9809,6 +9803,14 @@
 </file>
 
 <file path=customXml/itemProps2.xml><?xml version="1.0" encoding="utf-8"?>
+<ds:datastoreItem xmlns:ds="http://schemas.openxmlformats.org/officeDocument/2006/customXml" ds:itemID="{74228E6B-D70C-44BB-A81F-A245495F612B}">
+  <ds:schemaRefs>
+    <ds:schemaRef ds:uri="http://schemas.microsoft.com/sharepoint/v3/contenttype/forms"/>
+  </ds:schemaRefs>
+</ds:datastoreItem>
+</file>
+
+<file path=customXml/itemProps3.xml><?xml version="1.0" encoding="utf-8"?>
 <ds:datastoreItem xmlns:ds="http://schemas.openxmlformats.org/officeDocument/2006/customXml" ds:itemID="{00E41224-0370-4595-877C-23316CD80004}">
   <ds:schemaRefs>
     <ds:schemaRef ds:uri="http://schemas.openxmlformats.org/package/2006/metadata/core-properties"/>
@@ -9822,12 +9824,4 @@
     <ds:schemaRef ds:uri="http://purl.org/dc/dcmitype/"/>
   </ds:schemaRefs>
 </ds:datastoreItem>
-</file>
-
-<file path=customXml/itemProps3.xml><?xml version="1.0" encoding="utf-8"?>
-<ds:datastoreItem xmlns:ds="http://schemas.openxmlformats.org/officeDocument/2006/customXml" ds:itemID="{74228E6B-D70C-44BB-A81F-A245495F612B}">
-  <ds:schemaRefs>
-    <ds:schemaRef ds:uri="http://schemas.microsoft.com/sharepoint/v3/contenttype/forms"/>
-  </ds:schemaRefs>
-</ds:datastoreItem>
 </file>
</xml_diff>

<commit_message>
Finished my two slides
Let me know if you think I should add or alter any of my three slides
</commit_message>
<xml_diff>
--- a/Documents/ProjectPresentation.pptx
+++ b/Documents/ProjectPresentation.pptx
@@ -16,8 +16,8 @@
     <p:sldId id="267" r:id="rId7"/>
     <p:sldId id="268" r:id="rId8"/>
     <p:sldId id="269" r:id="rId9"/>
-    <p:sldId id="271" r:id="rId10"/>
-    <p:sldId id="273" r:id="rId11"/>
+    <p:sldId id="273" r:id="rId10"/>
+    <p:sldId id="271" r:id="rId11"/>
     <p:sldId id="274" r:id="rId12"/>
     <p:sldId id="272" r:id="rId13"/>
     <p:sldId id="275" r:id="rId14"/>
@@ -7491,7 +7491,7 @@
           <a:p>
             <a:r>
               <a:rPr lang="en-US" dirty="0"/>
-              <a:t>Reward System (Jay)</a:t>
+              <a:t>Environment (Jay)</a:t>
             </a:r>
           </a:p>
         </p:txBody>
@@ -7508,17 +7508,58 @@
         </p:nvSpPr>
         <p:spPr/>
         <p:txBody>
-          <a:bodyPr/>
+          <a:bodyPr>
+            <a:normAutofit fontScale="92500" lnSpcReduction="10000"/>
+          </a:bodyPr>
           <a:lstStyle/>
           <a:p>
-            <a:endParaRPr lang="en-US"/>
+            <a:r>
+              <a:rPr lang="en-US" dirty="0"/>
+              <a:t>Partially Observable through the game’s RAM</a:t>
+            </a:r>
+          </a:p>
+          <a:p>
+            <a:r>
+              <a:rPr lang="en-US" dirty="0"/>
+              <a:t>Deterministic not Stochastic</a:t>
+            </a:r>
+          </a:p>
+          <a:p>
+            <a:r>
+              <a:rPr lang="en-US" dirty="0"/>
+              <a:t>Multiple Agents</a:t>
+            </a:r>
+          </a:p>
+          <a:p>
+            <a:r>
+              <a:rPr lang="en-US" dirty="0"/>
+              <a:t>Sequential not Episodic</a:t>
+            </a:r>
+          </a:p>
+          <a:p>
+            <a:r>
+              <a:rPr lang="en-US" dirty="0"/>
+              <a:t>Dynamic not Static</a:t>
+            </a:r>
+          </a:p>
+          <a:p>
+            <a:r>
+              <a:rPr lang="en-US" dirty="0"/>
+              <a:t>Unknown physics</a:t>
+            </a:r>
+          </a:p>
+          <a:p>
+            <a:r>
+              <a:rPr lang="en-US" dirty="0"/>
+              <a:t>Discrete not continuous</a:t>
+            </a:r>
           </a:p>
         </p:txBody>
       </p:sp>
     </p:spTree>
     <p:extLst>
       <p:ext uri="{BB962C8B-B14F-4D97-AF65-F5344CB8AC3E}">
-        <p14:creationId xmlns:p14="http://schemas.microsoft.com/office/powerpoint/2010/main" val="198296853"/>
+        <p14:creationId xmlns:p14="http://schemas.microsoft.com/office/powerpoint/2010/main" val="1283098322"/>
       </p:ext>
     </p:extLst>
   </p:cSld>
@@ -7574,7 +7615,7 @@
           <a:p>
             <a:r>
               <a:rPr lang="en-US" dirty="0"/>
-              <a:t>Environment (Jay)</a:t>
+              <a:t>Reward System (Jay)</a:t>
             </a:r>
           </a:p>
         </p:txBody>
@@ -7591,58 +7632,41 @@
         </p:nvSpPr>
         <p:spPr/>
         <p:txBody>
-          <a:bodyPr>
-            <a:normAutofit fontScale="92500" lnSpcReduction="10000"/>
-          </a:bodyPr>
+          <a:bodyPr/>
           <a:lstStyle/>
           <a:p>
             <a:r>
               <a:rPr lang="en-US" dirty="0"/>
-              <a:t>Partially Observable through the game’s RAM</a:t>
+              <a:t>Used to let the bot know how it is doing</a:t>
             </a:r>
           </a:p>
           <a:p>
             <a:r>
               <a:rPr lang="en-US" dirty="0"/>
-              <a:t>Deterministic not Stochastic</a:t>
+              <a:t>Bot awarded a point for each time an opponent dies; Loses a point for dying</a:t>
             </a:r>
           </a:p>
           <a:p>
             <a:r>
               <a:rPr lang="en-US" dirty="0"/>
-              <a:t>Multiple Agents</a:t>
+              <a:t>Bot is awarded 0.01 points for each percent of damage inflicted on opponents and loses 0.01 for each percent of damage it takes</a:t>
             </a:r>
           </a:p>
           <a:p>
             <a:r>
               <a:rPr lang="en-US" dirty="0"/>
-              <a:t>Sequential not Episodic</a:t>
-            </a:r>
-          </a:p>
-          <a:p>
-            <a:r>
-              <a:rPr lang="en-US" dirty="0"/>
-              <a:t>Dynamic not Static</a:t>
-            </a:r>
-          </a:p>
-          <a:p>
-            <a:r>
-              <a:rPr lang="en-US" dirty="0"/>
-              <a:t>Unknown physics</a:t>
-            </a:r>
-          </a:p>
-          <a:p>
-            <a:r>
-              <a:rPr lang="en-US" dirty="0"/>
-              <a:t>Discrete not continuous</a:t>
-            </a:r>
+              <a:t>Bot also loses points at a reduced rate (20%) for their allies dying or sustaining damage</a:t>
+            </a:r>
+          </a:p>
+          <a:p>
+            <a:endParaRPr lang="en-US" dirty="0"/>
           </a:p>
         </p:txBody>
       </p:sp>
     </p:spTree>
     <p:extLst>
       <p:ext uri="{BB962C8B-B14F-4D97-AF65-F5344CB8AC3E}">
-        <p14:creationId xmlns:p14="http://schemas.microsoft.com/office/powerpoint/2010/main" val="1283098322"/>
+        <p14:creationId xmlns:p14="http://schemas.microsoft.com/office/powerpoint/2010/main" val="198296853"/>
       </p:ext>
     </p:extLst>
   </p:cSld>
@@ -7713,12 +7737,65 @@
             <p:ph idx="1"/>
           </p:nvPr>
         </p:nvSpPr>
-        <p:spPr/>
-        <p:txBody>
-          <a:bodyPr/>
+        <p:spPr>
+          <a:xfrm>
+            <a:off x="1483924" y="2362200"/>
+            <a:ext cx="10016104" cy="3429001"/>
+          </a:xfrm>
+        </p:spPr>
+        <p:txBody>
+          <a:bodyPr>
+            <a:normAutofit fontScale="92500" lnSpcReduction="10000"/>
+          </a:bodyPr>
           <a:lstStyle/>
           <a:p>
-            <a:endParaRPr lang="en-US"/>
+            <a:pPr marL="0" indent="0">
+              <a:buNone/>
+            </a:pPr>
+            <a:endParaRPr lang="en-US" dirty="0"/>
+          </a:p>
+          <a:p>
+            <a:r>
+              <a:rPr lang="en-US" dirty="0"/>
+              <a:t>Area in which the most problems we had arose</a:t>
+            </a:r>
+          </a:p>
+          <a:p>
+            <a:pPr lvl="1"/>
+            <a:r>
+              <a:rPr lang="en-US" dirty="0"/>
+              <a:t>Difficult to debug</a:t>
+            </a:r>
+          </a:p>
+          <a:p>
+            <a:pPr lvl="1"/>
+            <a:r>
+              <a:rPr lang="en-US" dirty="0"/>
+              <a:t>Had to reset our training on multiple occasions</a:t>
+            </a:r>
+          </a:p>
+          <a:p>
+            <a:pPr lvl="1"/>
+            <a:r>
+              <a:rPr lang="en-US" dirty="0"/>
+              <a:t>Can lead to overfitting if done incorrectly</a:t>
+            </a:r>
+          </a:p>
+          <a:p>
+            <a:r>
+              <a:rPr lang="en-US" dirty="0"/>
+              <a:t>Began training our bot against a single in-game level 5 opponent</a:t>
+            </a:r>
+          </a:p>
+          <a:p>
+            <a:r>
+              <a:rPr lang="en-US" dirty="0"/>
+              <a:t>Ended up using A3C’s shared network to speed up training by having two teams of two bots training with each other constantly.</a:t>
+            </a:r>
+          </a:p>
+          <a:p>
+            <a:pPr lvl="1"/>
+            <a:endParaRPr lang="en-US" dirty="0"/>
           </a:p>
         </p:txBody>
       </p:sp>
@@ -9649,15 +9726,6 @@
 </file>
 
 <file path=customXml/item2.xml><?xml version="1.0" encoding="utf-8"?>
-<?mso-contentType ?>
-<FormTemplates xmlns="http://schemas.microsoft.com/sharepoint/v3/contenttype/forms">
-  <Display>DocumentLibraryForm</Display>
-  <Edit>AssetEditForm</Edit>
-  <New>DocumentLibraryForm</New>
-</FormTemplates>
-</file>
-
-<file path=customXml/item3.xml><?xml version="1.0" encoding="utf-8"?>
 <p:properties xmlns:p="http://schemas.microsoft.com/office/2006/metadata/properties" xmlns:xsi="http://www.w3.org/2001/XMLSchema-instance" xmlns:pc="http://schemas.microsoft.com/office/infopath/2007/PartnerControls">
   <documentManagement>
     <DirectSourceMarket xmlns="4873beb7-5857-4685-be1f-d57550cc96cc" xsi:nil="true"/>
@@ -9784,6 +9852,15 @@
 </p:properties>
 </file>
 
+<file path=customXml/item3.xml><?xml version="1.0" encoding="utf-8"?>
+<?mso-contentType ?>
+<FormTemplates xmlns="http://schemas.microsoft.com/sharepoint/v3/contenttype/forms">
+  <Display>DocumentLibraryForm</Display>
+  <Edit>AssetEditForm</Edit>
+  <New>DocumentLibraryForm</New>
+</FormTemplates>
+</file>
+
 <file path=customXml/itemProps1.xml><?xml version="1.0" encoding="utf-8"?>
 <ds:datastoreItem xmlns:ds="http://schemas.openxmlformats.org/officeDocument/2006/customXml" ds:itemID="{22CCB507-0646-4A50-A4F7-7F385079D589}">
   <ds:schemaRefs>
@@ -9803,14 +9880,6 @@
 </file>
 
 <file path=customXml/itemProps2.xml><?xml version="1.0" encoding="utf-8"?>
-<ds:datastoreItem xmlns:ds="http://schemas.openxmlformats.org/officeDocument/2006/customXml" ds:itemID="{74228E6B-D70C-44BB-A81F-A245495F612B}">
-  <ds:schemaRefs>
-    <ds:schemaRef ds:uri="http://schemas.microsoft.com/sharepoint/v3/contenttype/forms"/>
-  </ds:schemaRefs>
-</ds:datastoreItem>
-</file>
-
-<file path=customXml/itemProps3.xml><?xml version="1.0" encoding="utf-8"?>
 <ds:datastoreItem xmlns:ds="http://schemas.openxmlformats.org/officeDocument/2006/customXml" ds:itemID="{00E41224-0370-4595-877C-23316CD80004}">
   <ds:schemaRefs>
     <ds:schemaRef ds:uri="http://schemas.openxmlformats.org/package/2006/metadata/core-properties"/>
@@ -9824,4 +9893,12 @@
     <ds:schemaRef ds:uri="http://purl.org/dc/dcmitype/"/>
   </ds:schemaRefs>
 </ds:datastoreItem>
+</file>
+
+<file path=customXml/itemProps3.xml><?xml version="1.0" encoding="utf-8"?>
+<ds:datastoreItem xmlns:ds="http://schemas.openxmlformats.org/officeDocument/2006/customXml" ds:itemID="{74228E6B-D70C-44BB-A81F-A245495F612B}">
+  <ds:schemaRefs>
+    <ds:schemaRef ds:uri="http://schemas.microsoft.com/sharepoint/v3/contenttype/forms"/>
+  </ds:schemaRefs>
+</ds:datastoreItem>
 </file>
</xml_diff>

<commit_message>
Completed the text on my slides
</commit_message>
<xml_diff>
--- a/Documents/ProjectPresentation.pptx
+++ b/Documents/ProjectPresentation.pptx
@@ -7319,7 +7319,7 @@
           <a:p>
             <a:r>
               <a:rPr lang="en-US" dirty="0"/>
-              <a:t>Fixing the Problem (Kegan)</a:t>
+              <a:t>Our Solution</a:t>
             </a:r>
           </a:p>
         </p:txBody>
@@ -7341,8 +7341,17 @@
           <a:p>
             <a:r>
               <a:rPr lang="en-US" dirty="0"/>
-              <a:t>Talk about what Reinforcement learning is and why we chose it over supervised and unsupervised.</a:t>
-            </a:r>
+              <a:t>Give the players a better AI to train against</a:t>
+            </a:r>
+          </a:p>
+          <a:p>
+            <a:r>
+              <a:rPr lang="en-US" dirty="0"/>
+              <a:t>Implement a reinforcement learning algorithm that will learn to play better than the players</a:t>
+            </a:r>
+          </a:p>
+          <a:p>
+            <a:endParaRPr lang="en-US" dirty="0"/>
           </a:p>
         </p:txBody>
       </p:sp>
@@ -7405,7 +7414,7 @@
           <a:p>
             <a:r>
               <a:rPr lang="en-US" dirty="0"/>
-              <a:t>Asynchronous Advantage Actor Critic (A3C) (Kegan)</a:t>
+              <a:t>Asynchronous Advantage Actor-Critic (A3C)</a:t>
             </a:r>
           </a:p>
         </p:txBody>
@@ -7422,13 +7431,56 @@
         </p:nvSpPr>
         <p:spPr/>
         <p:txBody>
-          <a:bodyPr/>
+          <a:bodyPr>
+            <a:normAutofit fontScale="92500" lnSpcReduction="10000"/>
+          </a:bodyPr>
           <a:lstStyle/>
           <a:p>
             <a:r>
               <a:rPr lang="en-US" dirty="0"/>
-              <a:t>After this slide I think we should show videos of the bots progression while learning. One of it before learning, one after a day or two, and one after a few weeks. We should also put in two or three clips of the bot running with an ally bot to show off A3C’s use with multiple agents.</a:t>
-            </a:r>
+              <a:t>A3C is a reinforcement learning algorithm</a:t>
+            </a:r>
+          </a:p>
+          <a:p>
+            <a:r>
+              <a:rPr lang="en-US" dirty="0"/>
+              <a:t>There is one global neural network</a:t>
+            </a:r>
+          </a:p>
+          <a:p>
+            <a:r>
+              <a:rPr lang="en-US" dirty="0"/>
+              <a:t>Each character controlled by our program has a local neural network</a:t>
+            </a:r>
+          </a:p>
+          <a:p>
+            <a:r>
+              <a:rPr lang="en-US" dirty="0"/>
+              <a:t>Before training, the global network is copied to all </a:t>
+            </a:r>
+            <a:r>
+              <a:rPr lang="en-US"/>
+              <a:t>local networks</a:t>
+            </a:r>
+            <a:endParaRPr lang="en-US" dirty="0"/>
+          </a:p>
+          <a:p>
+            <a:r>
+              <a:rPr lang="en-US" dirty="0"/>
+              <a:t>When updates are calculated for a character’s network, the updates are applied to the global network</a:t>
+            </a:r>
+          </a:p>
+          <a:p>
+            <a:r>
+              <a:rPr lang="en-US" dirty="0"/>
+              <a:t>The global network is then copied to the local network and training continues</a:t>
+            </a:r>
+          </a:p>
+          <a:p>
+            <a:endParaRPr lang="en-US" dirty="0"/>
+          </a:p>
+          <a:p>
+            <a:endParaRPr lang="en-US" dirty="0"/>
           </a:p>
         </p:txBody>
       </p:sp>
@@ -9726,6 +9778,15 @@
 </file>
 
 <file path=customXml/item2.xml><?xml version="1.0" encoding="utf-8"?>
+<?mso-contentType ?>
+<FormTemplates xmlns="http://schemas.microsoft.com/sharepoint/v3/contenttype/forms">
+  <Display>DocumentLibraryForm</Display>
+  <Edit>AssetEditForm</Edit>
+  <New>DocumentLibraryForm</New>
+</FormTemplates>
+</file>
+
+<file path=customXml/item3.xml><?xml version="1.0" encoding="utf-8"?>
 <p:properties xmlns:p="http://schemas.microsoft.com/office/2006/metadata/properties" xmlns:xsi="http://www.w3.org/2001/XMLSchema-instance" xmlns:pc="http://schemas.microsoft.com/office/infopath/2007/PartnerControls">
   <documentManagement>
     <DirectSourceMarket xmlns="4873beb7-5857-4685-be1f-d57550cc96cc" xsi:nil="true"/>
@@ -9852,15 +9913,6 @@
 </p:properties>
 </file>
 
-<file path=customXml/item3.xml><?xml version="1.0" encoding="utf-8"?>
-<?mso-contentType ?>
-<FormTemplates xmlns="http://schemas.microsoft.com/sharepoint/v3/contenttype/forms">
-  <Display>DocumentLibraryForm</Display>
-  <Edit>AssetEditForm</Edit>
-  <New>DocumentLibraryForm</New>
-</FormTemplates>
-</file>
-
 <file path=customXml/itemProps1.xml><?xml version="1.0" encoding="utf-8"?>
 <ds:datastoreItem xmlns:ds="http://schemas.openxmlformats.org/officeDocument/2006/customXml" ds:itemID="{22CCB507-0646-4A50-A4F7-7F385079D589}">
   <ds:schemaRefs>
@@ -9880,6 +9932,14 @@
 </file>
 
 <file path=customXml/itemProps2.xml><?xml version="1.0" encoding="utf-8"?>
+<ds:datastoreItem xmlns:ds="http://schemas.openxmlformats.org/officeDocument/2006/customXml" ds:itemID="{74228E6B-D70C-44BB-A81F-A245495F612B}">
+  <ds:schemaRefs>
+    <ds:schemaRef ds:uri="http://schemas.microsoft.com/sharepoint/v3/contenttype/forms"/>
+  </ds:schemaRefs>
+</ds:datastoreItem>
+</file>
+
+<file path=customXml/itemProps3.xml><?xml version="1.0" encoding="utf-8"?>
 <ds:datastoreItem xmlns:ds="http://schemas.openxmlformats.org/officeDocument/2006/customXml" ds:itemID="{00E41224-0370-4595-877C-23316CD80004}">
   <ds:schemaRefs>
     <ds:schemaRef ds:uri="http://schemas.openxmlformats.org/package/2006/metadata/core-properties"/>
@@ -9893,12 +9953,4 @@
     <ds:schemaRef ds:uri="http://purl.org/dc/dcmitype/"/>
   </ds:schemaRefs>
 </ds:datastoreItem>
-</file>
-
-<file path=customXml/itemProps3.xml><?xml version="1.0" encoding="utf-8"?>
-<ds:datastoreItem xmlns:ds="http://schemas.openxmlformats.org/officeDocument/2006/customXml" ds:itemID="{74228E6B-D70C-44BB-A81F-A245495F612B}">
-  <ds:schemaRefs>
-    <ds:schemaRef ds:uri="http://schemas.microsoft.com/sharepoint/v3/contenttype/forms"/>
-  </ds:schemaRefs>
-</ds:datastoreItem>
 </file>
</xml_diff>

<commit_message>
One small update on my slides
</commit_message>
<xml_diff>
--- a/Documents/ProjectPresentation.pptx
+++ b/Documents/ProjectPresentation.pptx
@@ -7543,7 +7543,7 @@
           <a:p>
             <a:r>
               <a:rPr lang="en-US" dirty="0"/>
-              <a:t>Environment (Jay)</a:t>
+              <a:t>Environment</a:t>
             </a:r>
           </a:p>
         </p:txBody>
@@ -7667,7 +7667,7 @@
           <a:p>
             <a:r>
               <a:rPr lang="en-US" dirty="0"/>
-              <a:t>Reward System (Jay)</a:t>
+              <a:t>Reward System</a:t>
             </a:r>
           </a:p>
         </p:txBody>
@@ -7774,7 +7774,7 @@
           <a:p>
             <a:r>
               <a:rPr lang="en-US" dirty="0"/>
-              <a:t>Training (Jay)</a:t>
+              <a:t>Training</a:t>
             </a:r>
           </a:p>
         </p:txBody>
@@ -9778,15 +9778,6 @@
 </file>
 
 <file path=customXml/item2.xml><?xml version="1.0" encoding="utf-8"?>
-<?mso-contentType ?>
-<FormTemplates xmlns="http://schemas.microsoft.com/sharepoint/v3/contenttype/forms">
-  <Display>DocumentLibraryForm</Display>
-  <Edit>AssetEditForm</Edit>
-  <New>DocumentLibraryForm</New>
-</FormTemplates>
-</file>
-
-<file path=customXml/item3.xml><?xml version="1.0" encoding="utf-8"?>
 <p:properties xmlns:p="http://schemas.microsoft.com/office/2006/metadata/properties" xmlns:xsi="http://www.w3.org/2001/XMLSchema-instance" xmlns:pc="http://schemas.microsoft.com/office/infopath/2007/PartnerControls">
   <documentManagement>
     <DirectSourceMarket xmlns="4873beb7-5857-4685-be1f-d57550cc96cc" xsi:nil="true"/>
@@ -9913,6 +9904,15 @@
 </p:properties>
 </file>
 
+<file path=customXml/item3.xml><?xml version="1.0" encoding="utf-8"?>
+<?mso-contentType ?>
+<FormTemplates xmlns="http://schemas.microsoft.com/sharepoint/v3/contenttype/forms">
+  <Display>DocumentLibraryForm</Display>
+  <Edit>AssetEditForm</Edit>
+  <New>DocumentLibraryForm</New>
+</FormTemplates>
+</file>
+
 <file path=customXml/itemProps1.xml><?xml version="1.0" encoding="utf-8"?>
 <ds:datastoreItem xmlns:ds="http://schemas.openxmlformats.org/officeDocument/2006/customXml" ds:itemID="{22CCB507-0646-4A50-A4F7-7F385079D589}">
   <ds:schemaRefs>
@@ -9932,14 +9932,6 @@
 </file>
 
 <file path=customXml/itemProps2.xml><?xml version="1.0" encoding="utf-8"?>
-<ds:datastoreItem xmlns:ds="http://schemas.openxmlformats.org/officeDocument/2006/customXml" ds:itemID="{74228E6B-D70C-44BB-A81F-A245495F612B}">
-  <ds:schemaRefs>
-    <ds:schemaRef ds:uri="http://schemas.microsoft.com/sharepoint/v3/contenttype/forms"/>
-  </ds:schemaRefs>
-</ds:datastoreItem>
-</file>
-
-<file path=customXml/itemProps3.xml><?xml version="1.0" encoding="utf-8"?>
 <ds:datastoreItem xmlns:ds="http://schemas.openxmlformats.org/officeDocument/2006/customXml" ds:itemID="{00E41224-0370-4595-877C-23316CD80004}">
   <ds:schemaRefs>
     <ds:schemaRef ds:uri="http://schemas.openxmlformats.org/package/2006/metadata/core-properties"/>
@@ -9953,4 +9945,12 @@
     <ds:schemaRef ds:uri="http://purl.org/dc/dcmitype/"/>
   </ds:schemaRefs>
 </ds:datastoreItem>
+</file>
+
+<file path=customXml/itemProps3.xml><?xml version="1.0" encoding="utf-8"?>
+<ds:datastoreItem xmlns:ds="http://schemas.openxmlformats.org/officeDocument/2006/customXml" ds:itemID="{74228E6B-D70C-44BB-A81F-A245495F612B}">
+  <ds:schemaRefs>
+    <ds:schemaRef ds:uri="http://schemas.microsoft.com/sharepoint/v3/contenttype/forms"/>
+  </ds:schemaRefs>
+</ds:datastoreItem>
 </file>
</xml_diff>

<commit_message>
Got rid of the Environment Slide
</commit_message>
<xml_diff>
--- a/Documents/ProjectPresentation.pptx
+++ b/Documents/ProjectPresentation.pptx
@@ -5,10 +5,10 @@
     <p:sldMasterId id="2147483876" r:id="rId4"/>
   </p:sldMasterIdLst>
   <p:notesMasterIdLst>
-    <p:notesMasterId r:id="rId15"/>
+    <p:notesMasterId r:id="rId14"/>
   </p:notesMasterIdLst>
   <p:handoutMasterIdLst>
-    <p:handoutMasterId r:id="rId16"/>
+    <p:handoutMasterId r:id="rId15"/>
   </p:handoutMasterIdLst>
   <p:sldIdLst>
     <p:sldId id="265" r:id="rId5"/>
@@ -16,16 +16,15 @@
     <p:sldId id="267" r:id="rId7"/>
     <p:sldId id="268" r:id="rId8"/>
     <p:sldId id="269" r:id="rId9"/>
-    <p:sldId id="273" r:id="rId10"/>
-    <p:sldId id="271" r:id="rId11"/>
-    <p:sldId id="274" r:id="rId12"/>
-    <p:sldId id="272" r:id="rId13"/>
-    <p:sldId id="275" r:id="rId14"/>
+    <p:sldId id="271" r:id="rId10"/>
+    <p:sldId id="274" r:id="rId11"/>
+    <p:sldId id="272" r:id="rId12"/>
+    <p:sldId id="275" r:id="rId13"/>
   </p:sldIdLst>
   <p:sldSz cx="12188825" cy="6858000"/>
   <p:notesSz cx="6858000" cy="9144000"/>
   <p:custDataLst>
-    <p:tags r:id="rId17"/>
+    <p:tags r:id="rId16"/>
   </p:custDataLst>
   <p:defaultTextStyle>
     <a:defPPr>
@@ -6925,89 +6924,6 @@
 </p:sld>
 </file>
 
-<file path=ppt/slides/slide10.xml><?xml version="1.0" encoding="utf-8"?>
-<p:sld xmlns:a="http://schemas.openxmlformats.org/drawingml/2006/main" xmlns:r="http://schemas.openxmlformats.org/officeDocument/2006/relationships" xmlns:p="http://schemas.openxmlformats.org/presentationml/2006/main">
-  <p:cSld>
-    <p:spTree>
-      <p:nvGrpSpPr>
-        <p:cNvPr id="1" name=""/>
-        <p:cNvGrpSpPr/>
-        <p:nvPr/>
-      </p:nvGrpSpPr>
-      <p:grpSpPr>
-        <a:xfrm>
-          <a:off x="0" y="0"/>
-          <a:ext cx="0" cy="0"/>
-          <a:chOff x="0" y="0"/>
-          <a:chExt cx="0" cy="0"/>
-        </a:xfrm>
-      </p:grpSpPr>
-      <p:sp>
-        <p:nvSpPr>
-          <p:cNvPr id="2" name="Title 1"/>
-          <p:cNvSpPr>
-            <a:spLocks noGrp="1"/>
-          </p:cNvSpPr>
-          <p:nvPr>
-            <p:ph type="title"/>
-          </p:nvPr>
-        </p:nvSpPr>
-        <p:spPr/>
-        <p:txBody>
-          <a:bodyPr/>
-          <a:lstStyle/>
-          <a:p>
-            <a:r>
-              <a:rPr lang="en-US" dirty="0"/>
-              <a:t>Applications (Jordan)</a:t>
-            </a:r>
-          </a:p>
-        </p:txBody>
-      </p:sp>
-      <p:sp>
-        <p:nvSpPr>
-          <p:cNvPr id="3" name="Content Placeholder 2"/>
-          <p:cNvSpPr>
-            <a:spLocks noGrp="1"/>
-          </p:cNvSpPr>
-          <p:nvPr>
-            <p:ph idx="1"/>
-          </p:nvPr>
-        </p:nvSpPr>
-        <p:spPr/>
-        <p:txBody>
-          <a:bodyPr/>
-          <a:lstStyle/>
-          <a:p>
-            <a:endParaRPr lang="en-US"/>
-          </a:p>
-        </p:txBody>
-      </p:sp>
-    </p:spTree>
-    <p:extLst>
-      <p:ext uri="{BB962C8B-B14F-4D97-AF65-F5344CB8AC3E}">
-        <p14:creationId xmlns:p14="http://schemas.microsoft.com/office/powerpoint/2010/main" val="755175350"/>
-      </p:ext>
-    </p:extLst>
-  </p:cSld>
-  <p:clrMapOvr>
-    <a:masterClrMapping/>
-  </p:clrMapOvr>
-  <mc:AlternateContent xmlns:mc="http://schemas.openxmlformats.org/markup-compatibility/2006" xmlns:p14="http://schemas.microsoft.com/office/powerpoint/2010/main">
-    <mc:Choice Requires="p14">
-      <p:transition spd="med" p14:dur="700">
-        <p:fade/>
-      </p:transition>
-    </mc:Choice>
-    <mc:Fallback xmlns="">
-      <p:transition spd="med">
-        <p:fade/>
-      </p:transition>
-    </mc:Fallback>
-  </mc:AlternateContent>
-</p:sld>
-</file>
-
 <file path=ppt/slides/slide2.xml><?xml version="1.0" encoding="utf-8"?>
 <p:sld xmlns:a="http://schemas.openxmlformats.org/drawingml/2006/main" xmlns:r="http://schemas.openxmlformats.org/officeDocument/2006/relationships" xmlns:p="http://schemas.openxmlformats.org/presentationml/2006/main">
   <p:cSld>
@@ -7543,7 +7459,7 @@
           <a:p>
             <a:r>
               <a:rPr lang="en-US" dirty="0"/>
-              <a:t>Environment</a:t>
+              <a:t>Reward System</a:t>
             </a:r>
           </a:p>
         </p:txBody>
@@ -7560,58 +7476,41 @@
         </p:nvSpPr>
         <p:spPr/>
         <p:txBody>
-          <a:bodyPr>
-            <a:normAutofit fontScale="92500" lnSpcReduction="10000"/>
-          </a:bodyPr>
+          <a:bodyPr/>
           <a:lstStyle/>
           <a:p>
             <a:r>
               <a:rPr lang="en-US" dirty="0"/>
-              <a:t>Partially Observable through the game’s RAM</a:t>
+              <a:t>Used to let the bot know how it is doing and adjust to seek higher rewards</a:t>
             </a:r>
           </a:p>
           <a:p>
             <a:r>
               <a:rPr lang="en-US" dirty="0"/>
-              <a:t>Deterministic not Stochastic</a:t>
+              <a:t>Bot awarded a point for each time an opponent dies; Loses a point for dying</a:t>
             </a:r>
           </a:p>
           <a:p>
             <a:r>
               <a:rPr lang="en-US" dirty="0"/>
-              <a:t>Multiple Agents</a:t>
+              <a:t>Bot is awarded 0.01 points for each percent of damage inflicted on opponents and loses 0.01 for each percent of damage it takes</a:t>
             </a:r>
           </a:p>
           <a:p>
             <a:r>
               <a:rPr lang="en-US" dirty="0"/>
-              <a:t>Sequential not Episodic</a:t>
-            </a:r>
-          </a:p>
-          <a:p>
-            <a:r>
-              <a:rPr lang="en-US" dirty="0"/>
-              <a:t>Dynamic not Static</a:t>
-            </a:r>
-          </a:p>
-          <a:p>
-            <a:r>
-              <a:rPr lang="en-US" dirty="0"/>
-              <a:t>Unknown physics</a:t>
-            </a:r>
-          </a:p>
-          <a:p>
-            <a:r>
-              <a:rPr lang="en-US" dirty="0"/>
-              <a:t>Discrete not continuous</a:t>
-            </a:r>
+              <a:t>Bot also loses points at a reduced rate (20%) for their allies dying or sustaining damage</a:t>
+            </a:r>
+          </a:p>
+          <a:p>
+            <a:endParaRPr lang="en-US" dirty="0"/>
           </a:p>
         </p:txBody>
       </p:sp>
     </p:spTree>
     <p:extLst>
       <p:ext uri="{BB962C8B-B14F-4D97-AF65-F5344CB8AC3E}">
-        <p14:creationId xmlns:p14="http://schemas.microsoft.com/office/powerpoint/2010/main" val="1283098322"/>
+        <p14:creationId xmlns:p14="http://schemas.microsoft.com/office/powerpoint/2010/main" val="198296853"/>
       </p:ext>
     </p:extLst>
   </p:cSld>
@@ -7667,7 +7566,7 @@
           <a:p>
             <a:r>
               <a:rPr lang="en-US" dirty="0"/>
-              <a:t>Reward System</a:t>
+              <a:t>Training</a:t>
             </a:r>
           </a:p>
         </p:txBody>
@@ -7682,35 +7581,64 @@
             <p:ph idx="1"/>
           </p:nvPr>
         </p:nvSpPr>
-        <p:spPr/>
-        <p:txBody>
-          <a:bodyPr/>
+        <p:spPr>
+          <a:xfrm>
+            <a:off x="1483924" y="2362200"/>
+            <a:ext cx="10016104" cy="3429001"/>
+          </a:xfrm>
+        </p:spPr>
+        <p:txBody>
+          <a:bodyPr>
+            <a:normAutofit fontScale="92500" lnSpcReduction="10000"/>
+          </a:bodyPr>
           <a:lstStyle/>
           <a:p>
+            <a:pPr marL="0" indent="0">
+              <a:buNone/>
+            </a:pPr>
+            <a:endParaRPr lang="en-US" dirty="0"/>
+          </a:p>
+          <a:p>
             <a:r>
               <a:rPr lang="en-US" dirty="0"/>
-              <a:t>Used to let the bot know how it is doing</a:t>
-            </a:r>
-          </a:p>
-          <a:p>
+              <a:t>Area in which the most problems we had arose</a:t>
+            </a:r>
+          </a:p>
+          <a:p>
+            <a:pPr lvl="1"/>
             <a:r>
               <a:rPr lang="en-US" dirty="0"/>
-              <a:t>Bot awarded a point for each time an opponent dies; Loses a point for dying</a:t>
-            </a:r>
-          </a:p>
-          <a:p>
+              <a:t>Difficult to debug</a:t>
+            </a:r>
+          </a:p>
+          <a:p>
+            <a:pPr lvl="1"/>
             <a:r>
               <a:rPr lang="en-US" dirty="0"/>
-              <a:t>Bot is awarded 0.01 points for each percent of damage inflicted on opponents and loses 0.01 for each percent of damage it takes</a:t>
-            </a:r>
-          </a:p>
-          <a:p>
+              <a:t>Had to reset our training on multiple occasions</a:t>
+            </a:r>
+          </a:p>
+          <a:p>
+            <a:pPr lvl="1"/>
             <a:r>
               <a:rPr lang="en-US" dirty="0"/>
-              <a:t>Bot also loses points at a reduced rate (20%) for their allies dying or sustaining damage</a:t>
-            </a:r>
-          </a:p>
-          <a:p>
+              <a:t>Can lead to overfitting if done incorrectly</a:t>
+            </a:r>
+          </a:p>
+          <a:p>
+            <a:r>
+              <a:rPr lang="en-US" dirty="0"/>
+              <a:t>Began training our bot against a single in-game level 5 opponent</a:t>
+            </a:r>
+          </a:p>
+          <a:p>
+            <a:r>
+              <a:rPr lang="en-US" dirty="0"/>
+              <a:t>Ended up using A3C’s shared network to speed up training by having two teams of two bots training with each other constantly.</a:t>
+            </a:r>
+          </a:p>
+          <a:p>
+            <a:pPr lvl="1"/>
             <a:endParaRPr lang="en-US" dirty="0"/>
           </a:p>
         </p:txBody>
@@ -7718,7 +7646,7 @@
     </p:spTree>
     <p:extLst>
       <p:ext uri="{BB962C8B-B14F-4D97-AF65-F5344CB8AC3E}">
-        <p14:creationId xmlns:p14="http://schemas.microsoft.com/office/powerpoint/2010/main" val="198296853"/>
+        <p14:creationId xmlns:p14="http://schemas.microsoft.com/office/powerpoint/2010/main" val="4159471737"/>
       </p:ext>
     </p:extLst>
   </p:cSld>
@@ -7773,8 +7701,12 @@
           <a:lstStyle/>
           <a:p>
             <a:r>
+              <a:rPr lang="en-US" dirty="0" err="1"/>
+              <a:t>PyQT</a:t>
+            </a:r>
+            <a:r>
               <a:rPr lang="en-US" dirty="0"/>
-              <a:t>Training</a:t>
+              <a:t> – GUI (Jordan)</a:t>
             </a:r>
           </a:p>
         </p:txBody>
@@ -7789,64 +7721,11 @@
             <p:ph idx="1"/>
           </p:nvPr>
         </p:nvSpPr>
-        <p:spPr>
-          <a:xfrm>
-            <a:off x="1483924" y="2362200"/>
-            <a:ext cx="10016104" cy="3429001"/>
-          </a:xfrm>
-        </p:spPr>
-        <p:txBody>
-          <a:bodyPr>
-            <a:normAutofit fontScale="92500" lnSpcReduction="10000"/>
-          </a:bodyPr>
+        <p:spPr/>
+        <p:txBody>
+          <a:bodyPr/>
           <a:lstStyle/>
           <a:p>
-            <a:pPr marL="0" indent="0">
-              <a:buNone/>
-            </a:pPr>
-            <a:endParaRPr lang="en-US" dirty="0"/>
-          </a:p>
-          <a:p>
-            <a:r>
-              <a:rPr lang="en-US" dirty="0"/>
-              <a:t>Area in which the most problems we had arose</a:t>
-            </a:r>
-          </a:p>
-          <a:p>
-            <a:pPr lvl="1"/>
-            <a:r>
-              <a:rPr lang="en-US" dirty="0"/>
-              <a:t>Difficult to debug</a:t>
-            </a:r>
-          </a:p>
-          <a:p>
-            <a:pPr lvl="1"/>
-            <a:r>
-              <a:rPr lang="en-US" dirty="0"/>
-              <a:t>Had to reset our training on multiple occasions</a:t>
-            </a:r>
-          </a:p>
-          <a:p>
-            <a:pPr lvl="1"/>
-            <a:r>
-              <a:rPr lang="en-US" dirty="0"/>
-              <a:t>Can lead to overfitting if done incorrectly</a:t>
-            </a:r>
-          </a:p>
-          <a:p>
-            <a:r>
-              <a:rPr lang="en-US" dirty="0"/>
-              <a:t>Began training our bot against a single in-game level 5 opponent</a:t>
-            </a:r>
-          </a:p>
-          <a:p>
-            <a:r>
-              <a:rPr lang="en-US" dirty="0"/>
-              <a:t>Ended up using A3C’s shared network to speed up training by having two teams of two bots training with each other constantly.</a:t>
-            </a:r>
-          </a:p>
-          <a:p>
-            <a:pPr lvl="1"/>
             <a:endParaRPr lang="en-US" dirty="0"/>
           </a:p>
         </p:txBody>
@@ -7854,7 +7733,7 @@
     </p:spTree>
     <p:extLst>
       <p:ext uri="{BB962C8B-B14F-4D97-AF65-F5344CB8AC3E}">
-        <p14:creationId xmlns:p14="http://schemas.microsoft.com/office/powerpoint/2010/main" val="4159471737"/>
+        <p14:creationId xmlns:p14="http://schemas.microsoft.com/office/powerpoint/2010/main" val="356333825"/>
       </p:ext>
     </p:extLst>
   </p:cSld>
@@ -7909,12 +7788,8 @@
           <a:lstStyle/>
           <a:p>
             <a:r>
-              <a:rPr lang="en-US" dirty="0" err="1"/>
-              <a:t>PyQT</a:t>
-            </a:r>
-            <a:r>
               <a:rPr lang="en-US" dirty="0"/>
-              <a:t> – GUI (Jordan)</a:t>
+              <a:t>Applications (Jordan)</a:t>
             </a:r>
           </a:p>
         </p:txBody>
@@ -7934,14 +7809,14 @@
           <a:bodyPr/>
           <a:lstStyle/>
           <a:p>
-            <a:endParaRPr lang="en-US" dirty="0"/>
+            <a:endParaRPr lang="en-US"/>
           </a:p>
         </p:txBody>
       </p:sp>
     </p:spTree>
     <p:extLst>
       <p:ext uri="{BB962C8B-B14F-4D97-AF65-F5344CB8AC3E}">
-        <p14:creationId xmlns:p14="http://schemas.microsoft.com/office/powerpoint/2010/main" val="356333825"/>
+        <p14:creationId xmlns:p14="http://schemas.microsoft.com/office/powerpoint/2010/main" val="755175350"/>
       </p:ext>
     </p:extLst>
   </p:cSld>
@@ -9778,6 +9653,15 @@
 </file>
 
 <file path=customXml/item2.xml><?xml version="1.0" encoding="utf-8"?>
+<?mso-contentType ?>
+<FormTemplates xmlns="http://schemas.microsoft.com/sharepoint/v3/contenttype/forms">
+  <Display>DocumentLibraryForm</Display>
+  <Edit>AssetEditForm</Edit>
+  <New>DocumentLibraryForm</New>
+</FormTemplates>
+</file>
+
+<file path=customXml/item3.xml><?xml version="1.0" encoding="utf-8"?>
 <p:properties xmlns:p="http://schemas.microsoft.com/office/2006/metadata/properties" xmlns:xsi="http://www.w3.org/2001/XMLSchema-instance" xmlns:pc="http://schemas.microsoft.com/office/infopath/2007/PartnerControls">
   <documentManagement>
     <DirectSourceMarket xmlns="4873beb7-5857-4685-be1f-d57550cc96cc" xsi:nil="true"/>
@@ -9904,15 +9788,6 @@
 </p:properties>
 </file>
 
-<file path=customXml/item3.xml><?xml version="1.0" encoding="utf-8"?>
-<?mso-contentType ?>
-<FormTemplates xmlns="http://schemas.microsoft.com/sharepoint/v3/contenttype/forms">
-  <Display>DocumentLibraryForm</Display>
-  <Edit>AssetEditForm</Edit>
-  <New>DocumentLibraryForm</New>
-</FormTemplates>
-</file>
-
 <file path=customXml/itemProps1.xml><?xml version="1.0" encoding="utf-8"?>
 <ds:datastoreItem xmlns:ds="http://schemas.openxmlformats.org/officeDocument/2006/customXml" ds:itemID="{22CCB507-0646-4A50-A4F7-7F385079D589}">
   <ds:schemaRefs>
@@ -9932,6 +9807,14 @@
 </file>
 
 <file path=customXml/itemProps2.xml><?xml version="1.0" encoding="utf-8"?>
+<ds:datastoreItem xmlns:ds="http://schemas.openxmlformats.org/officeDocument/2006/customXml" ds:itemID="{74228E6B-D70C-44BB-A81F-A245495F612B}">
+  <ds:schemaRefs>
+    <ds:schemaRef ds:uri="http://schemas.microsoft.com/sharepoint/v3/contenttype/forms"/>
+  </ds:schemaRefs>
+</ds:datastoreItem>
+</file>
+
+<file path=customXml/itemProps3.xml><?xml version="1.0" encoding="utf-8"?>
 <ds:datastoreItem xmlns:ds="http://schemas.openxmlformats.org/officeDocument/2006/customXml" ds:itemID="{00E41224-0370-4595-877C-23316CD80004}">
   <ds:schemaRefs>
     <ds:schemaRef ds:uri="http://schemas.openxmlformats.org/package/2006/metadata/core-properties"/>
@@ -9945,12 +9828,4 @@
     <ds:schemaRef ds:uri="http://purl.org/dc/dcmitype/"/>
   </ds:schemaRefs>
 </ds:datastoreItem>
-</file>
-
-<file path=customXml/itemProps3.xml><?xml version="1.0" encoding="utf-8"?>
-<ds:datastoreItem xmlns:ds="http://schemas.openxmlformats.org/officeDocument/2006/customXml" ds:itemID="{74228E6B-D70C-44BB-A81F-A245495F612B}">
-  <ds:schemaRefs>
-    <ds:schemaRef ds:uri="http://schemas.microsoft.com/sharepoint/v3/contenttype/forms"/>
-  </ds:schemaRefs>
-</ds:datastoreItem>
 </file>
</xml_diff>